<commit_message>
Funktionale und nicht-funktionale Anforderungen umbennant
</commit_message>
<xml_diff>
--- a/SnowCards_Requirements.pptx
+++ b/SnowCards_Requirements.pptx
@@ -8135,7 +8135,7 @@
           <p:spPr>
             <a:xfrm>
               <a:off x="176530" y="1113153"/>
-              <a:ext cx="2309119" cy="369332"/>
+              <a:ext cx="2309119" cy="368300"/>
             </a:xfrm>
             <a:prstGeom prst="rect">
               <a:avLst/>
@@ -8183,7 +8183,7 @@
                     <a:schemeClr val="tx1"/>
                   </a:solidFill>
                 </a:rPr>
-                <a:t>9</a:t>
+                <a:t>9A</a:t>
               </a:r>
               <a:endParaRPr lang="de-DE" b="1" dirty="0">
                 <a:solidFill>
@@ -8941,7 +8941,7 @@
           <p:spPr>
             <a:xfrm>
               <a:off x="176530" y="1113153"/>
-              <a:ext cx="2309119" cy="369332"/>
+              <a:ext cx="2309119" cy="368300"/>
             </a:xfrm>
             <a:prstGeom prst="rect">
               <a:avLst/>
@@ -8989,7 +8989,7 @@
                     <a:schemeClr val="tx1"/>
                   </a:solidFill>
                 </a:rPr>
-                <a:t> 10</a:t>
+                <a:t> 10A</a:t>
               </a:r>
               <a:endParaRPr lang="de-DE" b="1" dirty="0">
                 <a:solidFill>
@@ -9749,7 +9749,7 @@
           <p:spPr>
             <a:xfrm>
               <a:off x="176530" y="1113153"/>
-              <a:ext cx="2309119" cy="369332"/>
+              <a:ext cx="2309119" cy="368300"/>
             </a:xfrm>
             <a:prstGeom prst="rect">
               <a:avLst/>
@@ -9797,7 +9797,7 @@
                     <a:schemeClr val="tx1"/>
                   </a:solidFill>
                 </a:rPr>
-                <a:t> 11</a:t>
+                <a:t> 11A</a:t>
               </a:r>
               <a:endParaRPr lang="de-DE" b="1" dirty="0">
                 <a:solidFill>
@@ -10549,7 +10549,7 @@
           <p:spPr>
             <a:xfrm>
               <a:off x="176530" y="1113153"/>
-              <a:ext cx="2309119" cy="369332"/>
+              <a:ext cx="2309119" cy="368300"/>
             </a:xfrm>
             <a:prstGeom prst="rect">
               <a:avLst/>
@@ -10597,7 +10597,7 @@
                     <a:schemeClr val="tx1"/>
                   </a:solidFill>
                 </a:rPr>
-                <a:t> 12</a:t>
+                <a:t> 12A</a:t>
               </a:r>
               <a:endParaRPr lang="de-DE" b="1" dirty="0">
                 <a:solidFill>
@@ -11356,7 +11356,7 @@
           <p:spPr>
             <a:xfrm>
               <a:off x="176530" y="1113153"/>
-              <a:ext cx="2309119" cy="369332"/>
+              <a:ext cx="2309119" cy="368300"/>
             </a:xfrm>
             <a:prstGeom prst="rect">
               <a:avLst/>
@@ -11404,7 +11404,7 @@
                     <a:schemeClr val="tx1"/>
                   </a:solidFill>
                 </a:rPr>
-                <a:t> 13</a:t>
+                <a:t> 13A</a:t>
               </a:r>
               <a:endParaRPr lang="de-DE" b="1" dirty="0">
                 <a:solidFill>
@@ -12170,7 +12170,7 @@
           <p:spPr>
             <a:xfrm>
               <a:off x="176530" y="1113153"/>
-              <a:ext cx="2309119" cy="369332"/>
+              <a:ext cx="2309119" cy="368300"/>
             </a:xfrm>
             <a:prstGeom prst="rect">
               <a:avLst/>
@@ -12218,7 +12218,7 @@
                     <a:schemeClr val="tx1"/>
                   </a:solidFill>
                 </a:rPr>
-                <a:t> 14</a:t>
+                <a:t> 14A</a:t>
               </a:r>
               <a:endParaRPr lang="de-DE" b="1" dirty="0">
                 <a:solidFill>
@@ -13003,7 +13003,7 @@
           <p:spPr>
             <a:xfrm>
               <a:off x="176530" y="1113153"/>
-              <a:ext cx="2309119" cy="369332"/>
+              <a:ext cx="2309119" cy="368300"/>
             </a:xfrm>
             <a:prstGeom prst="rect">
               <a:avLst/>
@@ -13051,7 +13051,7 @@
                     <a:schemeClr val="tx1"/>
                   </a:solidFill>
                 </a:rPr>
-                <a:t> 15</a:t>
+                <a:t> 15A</a:t>
               </a:r>
               <a:endParaRPr lang="de-DE" b="1" dirty="0">
                 <a:solidFill>
@@ -13810,7 +13810,7 @@
           <p:spPr>
             <a:xfrm>
               <a:off x="176530" y="1113153"/>
-              <a:ext cx="2309119" cy="369332"/>
+              <a:ext cx="2309119" cy="368300"/>
             </a:xfrm>
             <a:prstGeom prst="rect">
               <a:avLst/>
@@ -13858,7 +13858,7 @@
                     <a:schemeClr val="tx1"/>
                   </a:solidFill>
                 </a:rPr>
-                <a:t>16</a:t>
+                <a:t>16A</a:t>
               </a:r>
               <a:endParaRPr lang="de-DE" b="1" dirty="0">
                 <a:solidFill>
@@ -14610,7 +14610,7 @@
           <p:spPr>
             <a:xfrm>
               <a:off x="176530" y="1113153"/>
-              <a:ext cx="2309119" cy="369332"/>
+              <a:ext cx="2309119" cy="368300"/>
             </a:xfrm>
             <a:prstGeom prst="rect">
               <a:avLst/>
@@ -14658,7 +14658,7 @@
                     <a:schemeClr val="tx1"/>
                   </a:solidFill>
                 </a:rPr>
-                <a:t> 17</a:t>
+                <a:t> 17A</a:t>
               </a:r>
               <a:endParaRPr lang="de-DE" b="1" dirty="0">
                 <a:solidFill>
@@ -15410,7 +15410,7 @@
           <p:spPr>
             <a:xfrm>
               <a:off x="176530" y="1113153"/>
-              <a:ext cx="2309119" cy="369332"/>
+              <a:ext cx="2309119" cy="368300"/>
             </a:xfrm>
             <a:prstGeom prst="rect">
               <a:avLst/>
@@ -15458,7 +15458,7 @@
                     <a:schemeClr val="tx1"/>
                   </a:solidFill>
                 </a:rPr>
-                <a:t>18</a:t>
+                <a:t>1B</a:t>
               </a:r>
               <a:endParaRPr lang="de-DE" b="1" dirty="0">
                 <a:solidFill>
@@ -16216,7 +16216,7 @@
           <p:spPr>
             <a:xfrm>
               <a:off x="176530" y="1113153"/>
-              <a:ext cx="2309119" cy="369332"/>
+              <a:ext cx="2309119" cy="368300"/>
             </a:xfrm>
             <a:prstGeom prst="rect">
               <a:avLst/>
@@ -16264,7 +16264,7 @@
                     <a:schemeClr val="tx1"/>
                   </a:solidFill>
                 </a:rPr>
-                <a:t>1</a:t>
+                <a:t>1A</a:t>
               </a:r>
               <a:endParaRPr lang="de-DE" b="1" dirty="0">
                 <a:solidFill>
@@ -17000,7 +17000,7 @@
           <p:spPr>
             <a:xfrm>
               <a:off x="176530" y="1113153"/>
-              <a:ext cx="2309119" cy="369332"/>
+              <a:ext cx="2309119" cy="368300"/>
             </a:xfrm>
             <a:prstGeom prst="rect">
               <a:avLst/>
@@ -17048,7 +17048,7 @@
                     <a:schemeClr val="tx1"/>
                   </a:solidFill>
                 </a:rPr>
-                <a:t> 19</a:t>
+                <a:t> 2B</a:t>
               </a:r>
               <a:endParaRPr lang="de-DE" b="1" dirty="0">
                 <a:solidFill>
@@ -17806,7 +17806,7 @@
           <p:spPr>
             <a:xfrm>
               <a:off x="176530" y="1113153"/>
-              <a:ext cx="2309119" cy="369332"/>
+              <a:ext cx="2309119" cy="368300"/>
             </a:xfrm>
             <a:prstGeom prst="rect">
               <a:avLst/>
@@ -17854,7 +17854,7 @@
                     <a:schemeClr val="tx1"/>
                   </a:solidFill>
                 </a:rPr>
-                <a:t> 20</a:t>
+                <a:t> 3B</a:t>
               </a:r>
               <a:endParaRPr lang="de-DE" b="1" dirty="0">
                 <a:solidFill>
@@ -18636,7 +18636,7 @@
           <p:spPr>
             <a:xfrm>
               <a:off x="176530" y="1113153"/>
-              <a:ext cx="2309119" cy="369332"/>
+              <a:ext cx="2309119" cy="368300"/>
             </a:xfrm>
             <a:prstGeom prst="rect">
               <a:avLst/>
@@ -18684,7 +18684,7 @@
                     <a:schemeClr val="tx1"/>
                   </a:solidFill>
                 </a:rPr>
-                <a:t> 21</a:t>
+                <a:t> 4B</a:t>
               </a:r>
               <a:endParaRPr lang="de-DE" b="1" dirty="0">
                 <a:solidFill>
@@ -19450,7 +19450,7 @@
           <p:spPr>
             <a:xfrm>
               <a:off x="176530" y="1113153"/>
-              <a:ext cx="2309119" cy="369332"/>
+              <a:ext cx="2309119" cy="368300"/>
             </a:xfrm>
             <a:prstGeom prst="rect">
               <a:avLst/>
@@ -19498,7 +19498,7 @@
                     <a:schemeClr val="tx1"/>
                   </a:solidFill>
                 </a:rPr>
-                <a:t> 22</a:t>
+                <a:t> 5B</a:t>
               </a:r>
               <a:endParaRPr lang="de-DE" b="1" dirty="0">
                 <a:solidFill>
@@ -20257,7 +20257,7 @@
           <p:spPr>
             <a:xfrm>
               <a:off x="176530" y="1113153"/>
-              <a:ext cx="2309119" cy="369332"/>
+              <a:ext cx="2309119" cy="368300"/>
             </a:xfrm>
             <a:prstGeom prst="rect">
               <a:avLst/>
@@ -20305,7 +20305,7 @@
                     <a:schemeClr val="tx1"/>
                   </a:solidFill>
                 </a:rPr>
-                <a:t> 23</a:t>
+                <a:t> 6B</a:t>
               </a:r>
               <a:endParaRPr lang="de-DE" b="1" dirty="0">
                 <a:solidFill>
@@ -21081,7 +21081,7 @@
           <p:spPr>
             <a:xfrm>
               <a:off x="176530" y="1113153"/>
-              <a:ext cx="2309119" cy="369332"/>
+              <a:ext cx="2309119" cy="368300"/>
             </a:xfrm>
             <a:prstGeom prst="rect">
               <a:avLst/>
@@ -21129,7 +21129,7 @@
                     <a:schemeClr val="tx1"/>
                   </a:solidFill>
                 </a:rPr>
-                <a:t> 24</a:t>
+                <a:t> 7B</a:t>
               </a:r>
               <a:endParaRPr lang="de-DE" b="1" dirty="0">
                 <a:solidFill>
@@ -21901,7 +21901,7 @@
           <p:spPr>
             <a:xfrm>
               <a:off x="176530" y="1113153"/>
-              <a:ext cx="2309119" cy="369332"/>
+              <a:ext cx="2309119" cy="368300"/>
             </a:xfrm>
             <a:prstGeom prst="rect">
               <a:avLst/>
@@ -21949,7 +21949,7 @@
                     <a:schemeClr val="tx1"/>
                   </a:solidFill>
                 </a:rPr>
-                <a:t>25</a:t>
+                <a:t>8B</a:t>
               </a:r>
               <a:endParaRPr lang="de-DE" b="1" dirty="0">
                 <a:solidFill>
@@ -22708,7 +22708,7 @@
           <p:spPr>
             <a:xfrm>
               <a:off x="176530" y="1113153"/>
-              <a:ext cx="2309119" cy="369332"/>
+              <a:ext cx="2309119" cy="368300"/>
             </a:xfrm>
             <a:prstGeom prst="rect">
               <a:avLst/>
@@ -22756,7 +22756,7 @@
                     <a:schemeClr val="tx1"/>
                   </a:solidFill>
                 </a:rPr>
-                <a:t> 26</a:t>
+                <a:t> 9B</a:t>
               </a:r>
               <a:endParaRPr lang="de-DE" b="1" dirty="0">
                 <a:solidFill>
@@ -23570,7 +23570,7 @@
                     <a:schemeClr val="tx1"/>
                   </a:solidFill>
                 </a:rPr>
-                <a:t> 27</a:t>
+                <a:t> 10B</a:t>
               </a:r>
               <a:endParaRPr lang="de-DE" b="1" dirty="0">
                 <a:solidFill>
@@ -24326,7 +24326,7 @@
           <p:spPr>
             <a:xfrm>
               <a:off x="176530" y="1113153"/>
-              <a:ext cx="2309119" cy="369332"/>
+              <a:ext cx="2309119" cy="368300"/>
             </a:xfrm>
             <a:prstGeom prst="rect">
               <a:avLst/>
@@ -24374,7 +24374,7 @@
                     <a:schemeClr val="tx1"/>
                   </a:solidFill>
                 </a:rPr>
-                <a:t>2</a:t>
+                <a:t>2A</a:t>
               </a:r>
               <a:endParaRPr lang="de-DE" b="1" dirty="0">
                 <a:solidFill>
@@ -25114,7 +25114,7 @@
           <p:spPr>
             <a:xfrm>
               <a:off x="176530" y="1113153"/>
-              <a:ext cx="2309119" cy="369332"/>
+              <a:ext cx="2309119" cy="368300"/>
             </a:xfrm>
             <a:prstGeom prst="rect">
               <a:avLst/>
@@ -25162,7 +25162,7 @@
                     <a:schemeClr val="tx1"/>
                   </a:solidFill>
                 </a:rPr>
-                <a:t>3</a:t>
+                <a:t>3A</a:t>
               </a:r>
               <a:endParaRPr lang="de-DE" b="1" dirty="0">
                 <a:solidFill>
@@ -25895,7 +25895,7 @@
           <p:spPr>
             <a:xfrm>
               <a:off x="176530" y="1113153"/>
-              <a:ext cx="2309119" cy="369332"/>
+              <a:ext cx="2309119" cy="368300"/>
             </a:xfrm>
             <a:prstGeom prst="rect">
               <a:avLst/>
@@ -25943,7 +25943,7 @@
                     <a:schemeClr val="tx1"/>
                   </a:solidFill>
                 </a:rPr>
-                <a:t>4</a:t>
+                <a:t>4A</a:t>
               </a:r>
               <a:endParaRPr lang="de-DE" b="1" dirty="0">
                 <a:solidFill>
@@ -26679,7 +26679,7 @@
           <p:spPr>
             <a:xfrm>
               <a:off x="176530" y="1113153"/>
-              <a:ext cx="2309119" cy="369332"/>
+              <a:ext cx="2309119" cy="368300"/>
             </a:xfrm>
             <a:prstGeom prst="rect">
               <a:avLst/>
@@ -26727,7 +26727,7 @@
                     <a:schemeClr val="tx1"/>
                   </a:solidFill>
                 </a:rPr>
-                <a:t>5</a:t>
+                <a:t>5A</a:t>
               </a:r>
               <a:endParaRPr lang="de-DE" b="1" dirty="0">
                 <a:solidFill>
@@ -27470,7 +27470,7 @@
           <p:spPr>
             <a:xfrm>
               <a:off x="176530" y="1113153"/>
-              <a:ext cx="2309119" cy="369332"/>
+              <a:ext cx="2309119" cy="368300"/>
             </a:xfrm>
             <a:prstGeom prst="rect">
               <a:avLst/>
@@ -27518,7 +27518,7 @@
                     <a:schemeClr val="tx1"/>
                   </a:solidFill>
                 </a:rPr>
-                <a:t> 6</a:t>
+                <a:t> 6A</a:t>
               </a:r>
               <a:endParaRPr lang="de-DE" b="1" dirty="0">
                 <a:solidFill>
@@ -28253,7 +28253,7 @@
           <p:spPr>
             <a:xfrm>
               <a:off x="176530" y="1113153"/>
-              <a:ext cx="2309119" cy="369332"/>
+              <a:ext cx="2309119" cy="368300"/>
             </a:xfrm>
             <a:prstGeom prst="rect">
               <a:avLst/>
@@ -28301,7 +28301,7 @@
                     <a:schemeClr val="tx1"/>
                   </a:solidFill>
                 </a:rPr>
-                <a:t> 7</a:t>
+                <a:t> 7A</a:t>
               </a:r>
               <a:endParaRPr lang="de-DE" b="1" dirty="0">
                 <a:solidFill>
@@ -29048,7 +29048,7 @@
           <p:spPr>
             <a:xfrm>
               <a:off x="176530" y="1113153"/>
-              <a:ext cx="2309119" cy="369332"/>
+              <a:ext cx="2309119" cy="368300"/>
             </a:xfrm>
             <a:prstGeom prst="rect">
               <a:avLst/>
@@ -29096,7 +29096,7 @@
                     <a:schemeClr val="tx1"/>
                   </a:solidFill>
                 </a:rPr>
-                <a:t>8</a:t>
+                <a:t>8A</a:t>
               </a:r>
               <a:endParaRPr lang="de-DE" b="1" dirty="0">
                 <a:solidFill>

</xml_diff>